<commit_message>
update figure in schematic_summary
Co-Authored-By: Cameron Dow <55721987+camerondow35@users.noreply.github.com>
</commit_message>
<xml_diff>
--- a/doc/manuscript/tables_figures/figures.pptx
+++ b/doc/manuscript/tables_figures/figures.pptx
@@ -104,6 +104,11 @@
       </a:defRPr>
     </a:lvl9pPr>
   </p:defaultTextStyle>
+  <p:extLst>
+    <p:ext uri="{EFAFB233-063F-42B5-8137-9DF3F51BA10A}">
+      <p15:sldGuideLst xmlns:p15="http://schemas.microsoft.com/office/powerpoint/2012/main"/>
+    </p:ext>
+  </p:extLst>
 </p:presentation>
 </file>
 
@@ -3355,39 +3360,6 @@
           </a:ln>
         </p:spPr>
       </p:pic>
-      <p:pic>
-        <p:nvPicPr>
-          <p:cNvPr id="5" name="Picture">
-            <a:extLst>
-              <a:ext uri="{FF2B5EF4-FFF2-40B4-BE49-F238E27FC236}">
-                <a16:creationId xmlns:a16="http://schemas.microsoft.com/office/drawing/2014/main" id="{C4E8E29D-961C-3C4D-B485-EC5206BE0021}"/>
-              </a:ext>
-            </a:extLst>
-          </p:cNvPr>
-          <p:cNvPicPr/>
-          <p:nvPr/>
-        </p:nvPicPr>
-        <p:blipFill rotWithShape="1">
-          <a:blip r:embed="rId3"/>
-          <a:srcRect t="16764"/>
-          <a:stretch/>
-        </p:blipFill>
-        <p:spPr bwMode="auto">
-          <a:xfrm>
-            <a:off x="715766" y="3585682"/>
-            <a:ext cx="5334000" cy="1957226"/>
-          </a:xfrm>
-          <a:prstGeom prst="rect">
-            <a:avLst/>
-          </a:prstGeom>
-          <a:noFill/>
-          <a:ln w="9525">
-            <a:noFill/>
-            <a:headEnd/>
-            <a:tailEnd/>
-          </a:ln>
-        </p:spPr>
-      </p:pic>
       <p:sp>
         <p:nvSpPr>
           <p:cNvPr id="30" name="Freeform 29">
@@ -4420,150 +4392,6 @@
       </p:sp>
       <p:sp>
         <p:nvSpPr>
-          <p:cNvPr id="16" name="TextBox 15">
-            <a:extLst>
-              <a:ext uri="{FF2B5EF4-FFF2-40B4-BE49-F238E27FC236}">
-                <a16:creationId xmlns:a16="http://schemas.microsoft.com/office/drawing/2014/main" id="{23383692-2684-8443-8D31-574380B6D36A}"/>
-              </a:ext>
-            </a:extLst>
-          </p:cNvPr>
-          <p:cNvSpPr txBox="1"/>
-          <p:nvPr/>
-        </p:nvSpPr>
-        <p:spPr>
-          <a:xfrm>
-            <a:off x="762000" y="3585682"/>
-            <a:ext cx="3479513" cy="369869"/>
-          </a:xfrm>
-          <a:prstGeom prst="rect">
-            <a:avLst/>
-          </a:prstGeom>
-          <a:noFill/>
-        </p:spPr>
-        <p:txBody>
-          <a:bodyPr wrap="square" rtlCol="0">
-            <a:spAutoFit/>
-          </a:bodyPr>
-          <a:lstStyle/>
-          <a:p>
-            <a:r>
-              <a:rPr lang="en-US" dirty="0"/>
-              <a:t>Variable -      definition</a:t>
-            </a:r>
-          </a:p>
-        </p:txBody>
-      </p:sp>
-      <p:sp>
-        <p:nvSpPr>
-          <p:cNvPr id="17" name="TextBox 16">
-            <a:extLst>
-              <a:ext uri="{FF2B5EF4-FFF2-40B4-BE49-F238E27FC236}">
-                <a16:creationId xmlns:a16="http://schemas.microsoft.com/office/drawing/2014/main" id="{9A6F678B-B546-0F46-A88B-05DA437BF252}"/>
-              </a:ext>
-            </a:extLst>
-          </p:cNvPr>
-          <p:cNvSpPr txBox="1"/>
-          <p:nvPr/>
-        </p:nvSpPr>
-        <p:spPr>
-          <a:xfrm>
-            <a:off x="4078844" y="3415880"/>
-            <a:ext cx="2106200" cy="276999"/>
-          </a:xfrm>
-          <a:prstGeom prst="rect">
-            <a:avLst/>
-          </a:prstGeom>
-          <a:noFill/>
-        </p:spPr>
-        <p:txBody>
-          <a:bodyPr wrap="square" rtlCol="0">
-            <a:spAutoFit/>
-          </a:bodyPr>
-          <a:lstStyle/>
-          <a:p>
-            <a:r>
-              <a:rPr lang="en-US" sz="1200" dirty="0"/>
-              <a:t>Response to warmer spring T</a:t>
-            </a:r>
-          </a:p>
-        </p:txBody>
-      </p:sp>
-      <p:cxnSp>
-        <p:nvCxnSpPr>
-          <p:cNvPr id="19" name="Straight Connector 18">
-            <a:extLst>
-              <a:ext uri="{FF2B5EF4-FFF2-40B4-BE49-F238E27FC236}">
-                <a16:creationId xmlns:a16="http://schemas.microsoft.com/office/drawing/2014/main" id="{2E2536E9-CEDD-8349-8825-4ED24F4CAB33}"/>
-              </a:ext>
-            </a:extLst>
-          </p:cNvPr>
-          <p:cNvCxnSpPr/>
-          <p:nvPr/>
-        </p:nvCxnSpPr>
-        <p:spPr>
-          <a:xfrm>
-            <a:off x="5640512" y="3765201"/>
-            <a:ext cx="308225" cy="1505443"/>
-          </a:xfrm>
-          <a:prstGeom prst="line">
-            <a:avLst/>
-          </a:prstGeom>
-        </p:spPr>
-        <p:style>
-          <a:lnRef idx="1">
-            <a:schemeClr val="accent1"/>
-          </a:lnRef>
-          <a:fillRef idx="0">
-            <a:schemeClr val="accent1"/>
-          </a:fillRef>
-          <a:effectRef idx="0">
-            <a:schemeClr val="accent1"/>
-          </a:effectRef>
-          <a:fontRef idx="minor">
-            <a:schemeClr val="tx1"/>
-          </a:fontRef>
-        </p:style>
-      </p:cxnSp>
-      <p:cxnSp>
-        <p:nvCxnSpPr>
-          <p:cNvPr id="20" name="Straight Connector 19">
-            <a:extLst>
-              <a:ext uri="{FF2B5EF4-FFF2-40B4-BE49-F238E27FC236}">
-                <a16:creationId xmlns:a16="http://schemas.microsoft.com/office/drawing/2014/main" id="{1F67B9EB-990C-6846-BDEA-7D355760CC92}"/>
-              </a:ext>
-            </a:extLst>
-          </p:cNvPr>
-          <p:cNvCxnSpPr>
-            <a:cxnSpLocks/>
-          </p:cNvCxnSpPr>
-          <p:nvPr/>
-        </p:nvCxnSpPr>
-        <p:spPr>
-          <a:xfrm flipH="1">
-            <a:off x="5640512" y="3765201"/>
-            <a:ext cx="215758" cy="1505443"/>
-          </a:xfrm>
-          <a:prstGeom prst="line">
-            <a:avLst/>
-          </a:prstGeom>
-        </p:spPr>
-        <p:style>
-          <a:lnRef idx="1">
-            <a:schemeClr val="accent1"/>
-          </a:lnRef>
-          <a:fillRef idx="0">
-            <a:schemeClr val="accent1"/>
-          </a:fillRef>
-          <a:effectRef idx="0">
-            <a:schemeClr val="accent1"/>
-          </a:effectRef>
-          <a:fontRef idx="minor">
-            <a:schemeClr val="tx1"/>
-          </a:fontRef>
-        </p:style>
-      </p:cxnSp>
-      <p:sp>
-        <p:nvSpPr>
           <p:cNvPr id="25" name="Freeform 24">
             <a:extLst>
               <a:ext uri="{FF2B5EF4-FFF2-40B4-BE49-F238E27FC236}">
@@ -5539,6 +5367,36 @@
           </a:fontRef>
         </p:style>
       </p:cxnSp>
+      <p:pic>
+        <p:nvPicPr>
+          <p:cNvPr id="3" name="Picture 2">
+            <a:extLst>
+              <a:ext uri="{FF2B5EF4-FFF2-40B4-BE49-F238E27FC236}">
+                <a16:creationId xmlns:a16="http://schemas.microsoft.com/office/drawing/2014/main" id="{1BCB3094-F22B-094E-AC14-B4BFB4813D6A}"/>
+              </a:ext>
+            </a:extLst>
+          </p:cNvPr>
+          <p:cNvPicPr>
+            <a:picLocks noChangeAspect="1"/>
+          </p:cNvPicPr>
+          <p:nvPr/>
+        </p:nvPicPr>
+        <p:blipFill>
+          <a:blip r:embed="rId3"/>
+          <a:stretch>
+            <a:fillRect/>
+          </a:stretch>
+        </p:blipFill>
+        <p:spPr>
+          <a:xfrm>
+            <a:off x="857393" y="3549804"/>
+            <a:ext cx="4943844" cy="2768803"/>
+          </a:xfrm>
+          <a:prstGeom prst="rect">
+            <a:avLst/>
+          </a:prstGeom>
+        </p:spPr>
+      </p:pic>
     </p:spTree>
     <p:extLst>
       <p:ext uri="{BB962C8B-B14F-4D97-AF65-F5344CB8AC3E}">

</xml_diff>

<commit_message>
update Table 1, fix up schematic summary
</commit_message>
<xml_diff>
--- a/doc/manuscript/tables_figures/figures.pptx
+++ b/doc/manuscript/tables_figures/figures.pptx
@@ -3374,8 +3374,8 @@
         </p:nvSpPr>
         <p:spPr>
           <a:xfrm>
-            <a:off x="976045" y="718458"/>
-            <a:ext cx="4633645" cy="2243660"/>
+            <a:off x="976045" y="791098"/>
+            <a:ext cx="4633645" cy="2191567"/>
           </a:xfrm>
           <a:custGeom>
             <a:avLst/>
@@ -4311,9 +4311,7 @@
             <a:avLst/>
           </a:prstGeom>
           <a:solidFill>
-            <a:schemeClr val="bg1">
-              <a:lumMod val="75000"/>
-            </a:schemeClr>
+            <a:schemeClr val="tx1"/>
           </a:solidFill>
         </p:spPr>
         <p:style>
@@ -5228,57 +5226,6 @@
           </a:p>
         </p:txBody>
       </p:sp>
-      <p:sp>
-        <p:nvSpPr>
-          <p:cNvPr id="10" name="Right Arrow 9">
-            <a:extLst>
-              <a:ext uri="{FF2B5EF4-FFF2-40B4-BE49-F238E27FC236}">
-                <a16:creationId xmlns:a16="http://schemas.microsoft.com/office/drawing/2014/main" id="{990B8002-7BA3-904A-910D-1B4C4064EF73}"/>
-              </a:ext>
-            </a:extLst>
-          </p:cNvPr>
-          <p:cNvSpPr/>
-          <p:nvPr/>
-        </p:nvSpPr>
-        <p:spPr>
-          <a:xfrm rot="5400000" flipH="1">
-            <a:off x="5320304" y="645552"/>
-            <a:ext cx="133555" cy="157539"/>
-          </a:xfrm>
-          <a:prstGeom prst="rightArrow">
-            <a:avLst/>
-          </a:prstGeom>
-          <a:solidFill>
-            <a:schemeClr val="bg1">
-              <a:lumMod val="75000"/>
-            </a:schemeClr>
-          </a:solidFill>
-        </p:spPr>
-        <p:style>
-          <a:lnRef idx="2">
-            <a:schemeClr val="accent1">
-              <a:shade val="50000"/>
-            </a:schemeClr>
-          </a:lnRef>
-          <a:fillRef idx="1">
-            <a:schemeClr val="accent1"/>
-          </a:fillRef>
-          <a:effectRef idx="0">
-            <a:schemeClr val="accent1"/>
-          </a:effectRef>
-          <a:fontRef idx="minor">
-            <a:schemeClr val="lt1"/>
-          </a:fontRef>
-        </p:style>
-        <p:txBody>
-          <a:bodyPr rtlCol="0" anchor="ctr"/>
-          <a:lstStyle/>
-          <a:p>
-            <a:pPr algn="ctr"/>
-            <a:endParaRPr lang="en-US"/>
-          </a:p>
-        </p:txBody>
-      </p:sp>
       <p:cxnSp>
         <p:nvCxnSpPr>
           <p:cNvPr id="32" name="Straight Arrow Connector 31">
@@ -5369,10 +5316,10 @@
       </p:cxnSp>
       <p:pic>
         <p:nvPicPr>
-          <p:cNvPr id="3" name="Picture 2">
-            <a:extLst>
-              <a:ext uri="{FF2B5EF4-FFF2-40B4-BE49-F238E27FC236}">
-                <a16:creationId xmlns:a16="http://schemas.microsoft.com/office/drawing/2014/main" id="{1BCB3094-F22B-094E-AC14-B4BFB4813D6A}"/>
+          <p:cNvPr id="12" name="Picture 11">
+            <a:extLst>
+              <a:ext uri="{FF2B5EF4-FFF2-40B4-BE49-F238E27FC236}">
+                <a16:creationId xmlns:a16="http://schemas.microsoft.com/office/drawing/2014/main" id="{A9979525-88BA-0446-A937-9103B41B8874}"/>
               </a:ext>
             </a:extLst>
           </p:cNvPr>
@@ -5389,14 +5336,146 @@
         </p:blipFill>
         <p:spPr>
           <a:xfrm>
-            <a:off x="857393" y="3549804"/>
-            <a:ext cx="4943844" cy="2768803"/>
+            <a:off x="869875" y="3553213"/>
+            <a:ext cx="5191453" cy="2513687"/>
           </a:xfrm>
           <a:prstGeom prst="rect">
             <a:avLst/>
           </a:prstGeom>
         </p:spPr>
       </p:pic>
+      <p:sp>
+        <p:nvSpPr>
+          <p:cNvPr id="13" name="TextBox 12">
+            <a:extLst>
+              <a:ext uri="{FF2B5EF4-FFF2-40B4-BE49-F238E27FC236}">
+                <a16:creationId xmlns:a16="http://schemas.microsoft.com/office/drawing/2014/main" id="{CCBA36B1-693C-2D4E-ACA4-F20296471D89}"/>
+              </a:ext>
+            </a:extLst>
+          </p:cNvPr>
+          <p:cNvSpPr txBox="1"/>
+          <p:nvPr/>
+        </p:nvSpPr>
+        <p:spPr>
+          <a:xfrm>
+            <a:off x="715767" y="195210"/>
+            <a:ext cx="476040" cy="276999"/>
+          </a:xfrm>
+          <a:prstGeom prst="rect">
+            <a:avLst/>
+          </a:prstGeom>
+          <a:noFill/>
+        </p:spPr>
+        <p:txBody>
+          <a:bodyPr wrap="square" rtlCol="0">
+            <a:spAutoFit/>
+          </a:bodyPr>
+          <a:lstStyle/>
+          <a:p>
+            <a:r>
+              <a:rPr lang="en-US" sz="1200" dirty="0"/>
+              <a:t>(a)</a:t>
+            </a:r>
+          </a:p>
+        </p:txBody>
+      </p:sp>
+      <p:sp>
+        <p:nvSpPr>
+          <p:cNvPr id="22" name="TextBox 21">
+            <a:extLst>
+              <a:ext uri="{FF2B5EF4-FFF2-40B4-BE49-F238E27FC236}">
+                <a16:creationId xmlns:a16="http://schemas.microsoft.com/office/drawing/2014/main" id="{17AA9409-00B9-8F4B-9C68-1E69FFB81241}"/>
+              </a:ext>
+            </a:extLst>
+          </p:cNvPr>
+          <p:cNvSpPr txBox="1"/>
+          <p:nvPr/>
+        </p:nvSpPr>
+        <p:spPr>
+          <a:xfrm>
+            <a:off x="715767" y="3635009"/>
+            <a:ext cx="476040" cy="276999"/>
+          </a:xfrm>
+          <a:prstGeom prst="rect">
+            <a:avLst/>
+          </a:prstGeom>
+          <a:noFill/>
+        </p:spPr>
+        <p:txBody>
+          <a:bodyPr wrap="square" rtlCol="0">
+            <a:spAutoFit/>
+          </a:bodyPr>
+          <a:lstStyle/>
+          <a:p>
+            <a:r>
+              <a:rPr lang="en-US" sz="1200" dirty="0"/>
+              <a:t>(b)</a:t>
+            </a:r>
+          </a:p>
+        </p:txBody>
+      </p:sp>
+      <p:sp>
+        <p:nvSpPr>
+          <p:cNvPr id="14" name="Up-Down Arrow 13">
+            <a:extLst>
+              <a:ext uri="{FF2B5EF4-FFF2-40B4-BE49-F238E27FC236}">
+                <a16:creationId xmlns:a16="http://schemas.microsoft.com/office/drawing/2014/main" id="{8257720F-82D2-E846-B712-A217803BADB2}"/>
+              </a:ext>
+            </a:extLst>
+          </p:cNvPr>
+          <p:cNvSpPr/>
+          <p:nvPr/>
+        </p:nvSpPr>
+        <p:spPr>
+          <a:xfrm>
+            <a:off x="5342563" y="656814"/>
+            <a:ext cx="133564" cy="237037"/>
+          </a:xfrm>
+          <a:prstGeom prst="upDownArrow">
+            <a:avLst/>
+          </a:prstGeom>
+          <a:solidFill>
+            <a:schemeClr val="bg1">
+              <a:lumMod val="65000"/>
+            </a:schemeClr>
+          </a:solidFill>
+          <a:ln>
+            <a:solidFill>
+              <a:schemeClr val="tx1"/>
+            </a:solidFill>
+          </a:ln>
+        </p:spPr>
+        <p:style>
+          <a:lnRef idx="2">
+            <a:schemeClr val="accent1">
+              <a:shade val="50000"/>
+            </a:schemeClr>
+          </a:lnRef>
+          <a:fillRef idx="1">
+            <a:schemeClr val="accent1"/>
+          </a:fillRef>
+          <a:effectRef idx="0">
+            <a:schemeClr val="accent1"/>
+          </a:effectRef>
+          <a:fontRef idx="minor">
+            <a:schemeClr val="lt1"/>
+          </a:fontRef>
+        </p:style>
+        <p:txBody>
+          <a:bodyPr rtlCol="0" anchor="ctr"/>
+          <a:lstStyle/>
+          <a:p>
+            <a:pPr algn="ctr"/>
+            <a:endParaRPr lang="en-US">
+              <a:ln>
+                <a:solidFill>
+                  <a:sysClr val="windowText" lastClr="000000"/>
+                </a:solidFill>
+              </a:ln>
+            </a:endParaRPr>
+          </a:p>
+        </p:txBody>
+      </p:sp>
     </p:spTree>
     <p:extLst>
       <p:ext uri="{BB962C8B-B14F-4D97-AF65-F5344CB8AC3E}">

</xml_diff>

<commit_message>
update hypotheses & schematic_summary
</commit_message>
<xml_diff>
--- a/doc/manuscript/tables_figures/figures.pptx
+++ b/doc/manuscript/tables_figures/figures.pptx
@@ -259,7 +259,7 @@
           <a:p>
             <a:fld id="{1064A42A-ECD1-1C40-9ACC-FE387D047D86}" type="datetimeFigureOut">
               <a:rPr lang="en-US" smtClean="0"/>
-              <a:t>12/10/20</a:t>
+              <a:t>12/11/20</a:t>
             </a:fld>
             <a:endParaRPr lang="en-US"/>
           </a:p>
@@ -457,7 +457,7 @@
           <a:p>
             <a:fld id="{1064A42A-ECD1-1C40-9ACC-FE387D047D86}" type="datetimeFigureOut">
               <a:rPr lang="en-US" smtClean="0"/>
-              <a:t>12/10/20</a:t>
+              <a:t>12/11/20</a:t>
             </a:fld>
             <a:endParaRPr lang="en-US"/>
           </a:p>
@@ -665,7 +665,7 @@
           <a:p>
             <a:fld id="{1064A42A-ECD1-1C40-9ACC-FE387D047D86}" type="datetimeFigureOut">
               <a:rPr lang="en-US" smtClean="0"/>
-              <a:t>12/10/20</a:t>
+              <a:t>12/11/20</a:t>
             </a:fld>
             <a:endParaRPr lang="en-US"/>
           </a:p>
@@ -863,7 +863,7 @@
           <a:p>
             <a:fld id="{1064A42A-ECD1-1C40-9ACC-FE387D047D86}" type="datetimeFigureOut">
               <a:rPr lang="en-US" smtClean="0"/>
-              <a:t>12/10/20</a:t>
+              <a:t>12/11/20</a:t>
             </a:fld>
             <a:endParaRPr lang="en-US"/>
           </a:p>
@@ -1138,7 +1138,7 @@
           <a:p>
             <a:fld id="{1064A42A-ECD1-1C40-9ACC-FE387D047D86}" type="datetimeFigureOut">
               <a:rPr lang="en-US" smtClean="0"/>
-              <a:t>12/10/20</a:t>
+              <a:t>12/11/20</a:t>
             </a:fld>
             <a:endParaRPr lang="en-US"/>
           </a:p>
@@ -1403,7 +1403,7 @@
           <a:p>
             <a:fld id="{1064A42A-ECD1-1C40-9ACC-FE387D047D86}" type="datetimeFigureOut">
               <a:rPr lang="en-US" smtClean="0"/>
-              <a:t>12/10/20</a:t>
+              <a:t>12/11/20</a:t>
             </a:fld>
             <a:endParaRPr lang="en-US"/>
           </a:p>
@@ -1815,7 +1815,7 @@
           <a:p>
             <a:fld id="{1064A42A-ECD1-1C40-9ACC-FE387D047D86}" type="datetimeFigureOut">
               <a:rPr lang="en-US" smtClean="0"/>
-              <a:t>12/10/20</a:t>
+              <a:t>12/11/20</a:t>
             </a:fld>
             <a:endParaRPr lang="en-US"/>
           </a:p>
@@ -1956,7 +1956,7 @@
           <a:p>
             <a:fld id="{1064A42A-ECD1-1C40-9ACC-FE387D047D86}" type="datetimeFigureOut">
               <a:rPr lang="en-US" smtClean="0"/>
-              <a:t>12/10/20</a:t>
+              <a:t>12/11/20</a:t>
             </a:fld>
             <a:endParaRPr lang="en-US"/>
           </a:p>
@@ -2069,7 +2069,7 @@
           <a:p>
             <a:fld id="{1064A42A-ECD1-1C40-9ACC-FE387D047D86}" type="datetimeFigureOut">
               <a:rPr lang="en-US" smtClean="0"/>
-              <a:t>12/10/20</a:t>
+              <a:t>12/11/20</a:t>
             </a:fld>
             <a:endParaRPr lang="en-US"/>
           </a:p>
@@ -2380,7 +2380,7 @@
           <a:p>
             <a:fld id="{1064A42A-ECD1-1C40-9ACC-FE387D047D86}" type="datetimeFigureOut">
               <a:rPr lang="en-US" smtClean="0"/>
-              <a:t>12/10/20</a:t>
+              <a:t>12/11/20</a:t>
             </a:fld>
             <a:endParaRPr lang="en-US"/>
           </a:p>
@@ -2668,7 +2668,7 @@
           <a:p>
             <a:fld id="{1064A42A-ECD1-1C40-9ACC-FE387D047D86}" type="datetimeFigureOut">
               <a:rPr lang="en-US" smtClean="0"/>
-              <a:t>12/10/20</a:t>
+              <a:t>12/11/20</a:t>
             </a:fld>
             <a:endParaRPr lang="en-US"/>
           </a:p>
@@ -2909,7 +2909,7 @@
           <a:p>
             <a:fld id="{1064A42A-ECD1-1C40-9ACC-FE387D047D86}" type="datetimeFigureOut">
               <a:rPr lang="en-US" smtClean="0"/>
-              <a:t>12/10/20</a:t>
+              <a:t>12/11/20</a:t>
             </a:fld>
             <a:endParaRPr lang="en-US"/>
           </a:p>
@@ -3328,6 +3328,36 @@
       </p:grpSpPr>
       <p:pic>
         <p:nvPicPr>
+          <p:cNvPr id="2" name="Picture 1">
+            <a:extLst>
+              <a:ext uri="{FF2B5EF4-FFF2-40B4-BE49-F238E27FC236}">
+                <a16:creationId xmlns:a16="http://schemas.microsoft.com/office/drawing/2014/main" id="{F014F6B0-0A15-1C45-9120-17D18C5F7B17}"/>
+              </a:ext>
+            </a:extLst>
+          </p:cNvPr>
+          <p:cNvPicPr>
+            <a:picLocks noChangeAspect="1"/>
+          </p:cNvPicPr>
+          <p:nvPr/>
+        </p:nvPicPr>
+        <p:blipFill>
+          <a:blip r:embed="rId2"/>
+          <a:stretch>
+            <a:fillRect/>
+          </a:stretch>
+        </p:blipFill>
+        <p:spPr>
+          <a:xfrm>
+            <a:off x="715767" y="3635008"/>
+            <a:ext cx="5119886" cy="2507297"/>
+          </a:xfrm>
+          <a:prstGeom prst="rect">
+            <a:avLst/>
+          </a:prstGeom>
+        </p:spPr>
+      </p:pic>
+      <p:pic>
+        <p:nvPicPr>
           <p:cNvPr id="4" name="Picture" descr="Figure 1. Schematic illustrating the parameters considered here. Shown are measurements for an example tree (## cm SPECIES), fit with the model of McMahon &amp; Parker (2015), from which phenology and growth rate parameters are obtained.">
             <a:extLst>
               <a:ext uri="{FF2B5EF4-FFF2-40B4-BE49-F238E27FC236}">
@@ -3339,7 +3369,7 @@
           <p:nvPr/>
         </p:nvPicPr>
         <p:blipFill>
-          <a:blip r:embed="rId2"/>
+          <a:blip r:embed="rId3"/>
           <a:stretch>
             <a:fillRect/>
           </a:stretch>
@@ -5314,36 +5344,6 @@
           </a:fontRef>
         </p:style>
       </p:cxnSp>
-      <p:pic>
-        <p:nvPicPr>
-          <p:cNvPr id="12" name="Picture 11">
-            <a:extLst>
-              <a:ext uri="{FF2B5EF4-FFF2-40B4-BE49-F238E27FC236}">
-                <a16:creationId xmlns:a16="http://schemas.microsoft.com/office/drawing/2014/main" id="{A9979525-88BA-0446-A937-9103B41B8874}"/>
-              </a:ext>
-            </a:extLst>
-          </p:cNvPr>
-          <p:cNvPicPr>
-            <a:picLocks noChangeAspect="1"/>
-          </p:cNvPicPr>
-          <p:nvPr/>
-        </p:nvPicPr>
-        <p:blipFill>
-          <a:blip r:embed="rId3"/>
-          <a:stretch>
-            <a:fillRect/>
-          </a:stretch>
-        </p:blipFill>
-        <p:spPr>
-          <a:xfrm>
-            <a:off x="869875" y="3553213"/>
-            <a:ext cx="5191453" cy="2513687"/>
-          </a:xfrm>
-          <a:prstGeom prst="rect">
-            <a:avLst/>
-          </a:prstGeom>
-        </p:spPr>
-      </p:pic>
       <p:sp>
         <p:nvSpPr>
           <p:cNvPr id="13" name="TextBox 12">

</xml_diff>